<commit_message>
Commit Enunciado Evaluacion 2 10 puntos
</commit_message>
<xml_diff>
--- a/Slides/4_Patrones_Creacionales.pptx
+++ b/Slides/4_Patrones_Creacionales.pptx
@@ -1770,6 +1770,30 @@
     </pc:docChg>
   </pc:docChgLst>
   <pc:docChgLst>
+    <pc:chgData name="Cesar Augusto Lopez Gallego" userId="0dfa9112-9251-4882-b472-cf2dfcee09d1" providerId="ADAL" clId="{C1E26E9B-6716-4F54-945C-727791E9716A}"/>
+    <pc:docChg chg="modSld">
+      <pc:chgData name="Cesar Augusto Lopez Gallego" userId="0dfa9112-9251-4882-b472-cf2dfcee09d1" providerId="ADAL" clId="{C1E26E9B-6716-4F54-945C-727791E9716A}" dt="2025-03-05T12:45:35.897" v="0" actId="403"/>
+      <pc:docMkLst>
+        <pc:docMk/>
+      </pc:docMkLst>
+      <pc:sldChg chg="modSp">
+        <pc:chgData name="Cesar Augusto Lopez Gallego" userId="0dfa9112-9251-4882-b472-cf2dfcee09d1" providerId="ADAL" clId="{C1E26E9B-6716-4F54-945C-727791E9716A}" dt="2025-03-05T12:45:35.897" v="0" actId="403"/>
+        <pc:sldMkLst>
+          <pc:docMk/>
+          <pc:sldMk cId="2157447811" sldId="342"/>
+        </pc:sldMkLst>
+        <pc:spChg chg="mod">
+          <ac:chgData name="Cesar Augusto Lopez Gallego" userId="0dfa9112-9251-4882-b472-cf2dfcee09d1" providerId="ADAL" clId="{C1E26E9B-6716-4F54-945C-727791E9716A}" dt="2025-03-05T12:45:35.897" v="0" actId="403"/>
+          <ac:spMkLst>
+            <pc:docMk/>
+            <pc:sldMk cId="2157447811" sldId="342"/>
+            <ac:spMk id="4" creationId="{3260ABB1-6F18-4088-8C5B-2C8E6A5212FE}"/>
+          </ac:spMkLst>
+        </pc:spChg>
+      </pc:sldChg>
+    </pc:docChg>
+  </pc:docChgLst>
+  <pc:docChgLst>
     <pc:chgData name="lina jimenez" userId="f3850f8cd7bedeb0" providerId="LiveId" clId="{BB9DFD16-0FEA-4A89-8A1F-CE996C7E27DB}"/>
     <pc:docChg chg="modSld">
       <pc:chgData name="lina jimenez" userId="f3850f8cd7bedeb0" providerId="LiveId" clId="{BB9DFD16-0FEA-4A89-8A1F-CE996C7E27DB}" dt="2025-02-25T01:46:21.933" v="0" actId="20577"/>
@@ -3064,7 +3088,7 @@
           <a:p>
             <a:fld id="{6B86245D-015E-46AE-96CC-32E8A5E9A1DF}" type="datetimeFigureOut">
               <a:rPr lang="es-CO" smtClean="0"/>
-              <a:t>26/02/2025</a:t>
+              <a:t>5/03/2025</a:t>
             </a:fld>
             <a:endParaRPr lang="es-CO"/>
           </a:p>
@@ -3234,7 +3258,7 @@
           <a:p>
             <a:fld id="{6B86245D-015E-46AE-96CC-32E8A5E9A1DF}" type="datetimeFigureOut">
               <a:rPr lang="es-CO" smtClean="0"/>
-              <a:t>26/02/2025</a:t>
+              <a:t>5/03/2025</a:t>
             </a:fld>
             <a:endParaRPr lang="es-CO"/>
           </a:p>
@@ -3466,7 +3490,7 @@
           <a:p>
             <a:fld id="{6B86245D-015E-46AE-96CC-32E8A5E9A1DF}" type="datetimeFigureOut">
               <a:rPr lang="es-CO" smtClean="0"/>
-              <a:t>26/02/2025</a:t>
+              <a:t>5/03/2025</a:t>
             </a:fld>
             <a:endParaRPr lang="es-CO"/>
           </a:p>
@@ -3658,7 +3682,7 @@
           <a:p>
             <a:fld id="{6B86245D-015E-46AE-96CC-32E8A5E9A1DF}" type="datetimeFigureOut">
               <a:rPr lang="es-CO" smtClean="0"/>
-              <a:t>26/02/2025</a:t>
+              <a:t>5/03/2025</a:t>
             </a:fld>
             <a:endParaRPr lang="es-CO"/>
           </a:p>
@@ -22442,7 +22466,7 @@
         <p:spPr>
           <a:xfrm>
             <a:off x="487680" y="531614"/>
-            <a:ext cx="6690360" cy="584775"/>
+            <a:ext cx="6690360" cy="646331"/>
           </a:xfrm>
           <a:prstGeom prst="rect">
             <a:avLst/>
@@ -22456,7 +22480,7 @@
           <a:lstStyle/>
           <a:p>
             <a:r>
-              <a:rPr lang="es-ES" sz="3200" dirty="0"/>
+              <a:rPr lang="es-ES" sz="3600" dirty="0"/>
               <a:t>Estructura</a:t>
             </a:r>
           </a:p>

</xml_diff>